<commit_message>
Added new examples (mini profiler)..
</commit_message>
<xml_diff>
--- a/Doc/Prezentace-dotazovani.pptx
+++ b/Doc/Prezentace-dotazovani.pptx
@@ -261,7 +261,7 @@
           <a:p>
             <a:fld id="{8725CDB3-0518-4E68-B4FF-B948AD6ADE2B}" type="datetimeFigureOut">
               <a:rPr lang="cs-CZ" smtClean="0"/>
-              <a:t>09.12.2015</a:t>
+              <a:t>12.12.2015</a:t>
             </a:fld>
             <a:endParaRPr lang="cs-CZ"/>
           </a:p>
@@ -431,7 +431,7 @@
           <a:p>
             <a:fld id="{8725CDB3-0518-4E68-B4FF-B948AD6ADE2B}" type="datetimeFigureOut">
               <a:rPr lang="cs-CZ" smtClean="0"/>
-              <a:t>09.12.2015</a:t>
+              <a:t>12.12.2015</a:t>
             </a:fld>
             <a:endParaRPr lang="cs-CZ"/>
           </a:p>
@@ -611,7 +611,7 @@
           <a:p>
             <a:fld id="{8725CDB3-0518-4E68-B4FF-B948AD6ADE2B}" type="datetimeFigureOut">
               <a:rPr lang="cs-CZ" smtClean="0"/>
-              <a:t>09.12.2015</a:t>
+              <a:t>12.12.2015</a:t>
             </a:fld>
             <a:endParaRPr lang="cs-CZ"/>
           </a:p>
@@ -781,7 +781,7 @@
           <a:p>
             <a:fld id="{8725CDB3-0518-4E68-B4FF-B948AD6ADE2B}" type="datetimeFigureOut">
               <a:rPr lang="cs-CZ" smtClean="0"/>
-              <a:t>09.12.2015</a:t>
+              <a:t>12.12.2015</a:t>
             </a:fld>
             <a:endParaRPr lang="cs-CZ"/>
           </a:p>
@@ -1032,7 +1032,7 @@
           <a:p>
             <a:fld id="{8725CDB3-0518-4E68-B4FF-B948AD6ADE2B}" type="datetimeFigureOut">
               <a:rPr lang="cs-CZ" smtClean="0"/>
-              <a:t>09.12.2015</a:t>
+              <a:t>12.12.2015</a:t>
             </a:fld>
             <a:endParaRPr lang="cs-CZ"/>
           </a:p>
@@ -1264,7 +1264,7 @@
           <a:p>
             <a:fld id="{8725CDB3-0518-4E68-B4FF-B948AD6ADE2B}" type="datetimeFigureOut">
               <a:rPr lang="cs-CZ" smtClean="0"/>
-              <a:t>09.12.2015</a:t>
+              <a:t>12.12.2015</a:t>
             </a:fld>
             <a:endParaRPr lang="cs-CZ"/>
           </a:p>
@@ -1611,7 +1611,7 @@
           <a:p>
             <a:fld id="{8725CDB3-0518-4E68-B4FF-B948AD6ADE2B}" type="datetimeFigureOut">
               <a:rPr lang="cs-CZ" smtClean="0"/>
-              <a:t>09.12.2015</a:t>
+              <a:t>12.12.2015</a:t>
             </a:fld>
             <a:endParaRPr lang="cs-CZ"/>
           </a:p>
@@ -1729,7 +1729,7 @@
           <a:p>
             <a:fld id="{8725CDB3-0518-4E68-B4FF-B948AD6ADE2B}" type="datetimeFigureOut">
               <a:rPr lang="cs-CZ" smtClean="0"/>
-              <a:t>09.12.2015</a:t>
+              <a:t>12.12.2015</a:t>
             </a:fld>
             <a:endParaRPr lang="cs-CZ"/>
           </a:p>
@@ -1847,7 +1847,7 @@
           <a:p>
             <a:fld id="{8725CDB3-0518-4E68-B4FF-B948AD6ADE2B}" type="datetimeFigureOut">
               <a:rPr lang="cs-CZ" smtClean="0"/>
-              <a:t>09.12.2015</a:t>
+              <a:t>12.12.2015</a:t>
             </a:fld>
             <a:endParaRPr lang="cs-CZ"/>
           </a:p>
@@ -2131,7 +2131,7 @@
           <a:p>
             <a:fld id="{8725CDB3-0518-4E68-B4FF-B948AD6ADE2B}" type="datetimeFigureOut">
               <a:rPr lang="cs-CZ" smtClean="0"/>
-              <a:t>09.12.2015</a:t>
+              <a:t>12.12.2015</a:t>
             </a:fld>
             <a:endParaRPr lang="cs-CZ"/>
           </a:p>
@@ -2395,7 +2395,7 @@
           <a:p>
             <a:fld id="{8725CDB3-0518-4E68-B4FF-B948AD6ADE2B}" type="datetimeFigureOut">
               <a:rPr lang="cs-CZ" smtClean="0"/>
-              <a:t>09.12.2015</a:t>
+              <a:t>12.12.2015</a:t>
             </a:fld>
             <a:endParaRPr lang="cs-CZ"/>
           </a:p>
@@ -2609,7 +2609,7 @@
           <a:p>
             <a:fld id="{8725CDB3-0518-4E68-B4FF-B948AD6ADE2B}" type="datetimeFigureOut">
               <a:rPr lang="cs-CZ" smtClean="0"/>
-              <a:t>09.12.2015</a:t>
+              <a:t>12.12.2015</a:t>
             </a:fld>
             <a:endParaRPr lang="cs-CZ"/>
           </a:p>
@@ -4788,7 +4788,7 @@
         <p:spPr>
           <a:xfrm>
             <a:off x="241068" y="3769577"/>
-            <a:ext cx="8129847" cy="1421928"/>
+            <a:ext cx="8129847" cy="1865126"/>
           </a:xfrm>
           <a:prstGeom prst="rect">
             <a:avLst/>
@@ -4855,8 +4855,25 @@
                 <a:latin typeface="Segoe UI" panose="020B0502040204020203" pitchFamily="34" charset="0"/>
                 <a:cs typeface="Segoe UI" panose="020B0502040204020203" pitchFamily="34" charset="0"/>
               </a:rPr>
-              <a:t>(free)</a:t>
-            </a:r>
+              <a:t>(free</a:t>
+            </a:r>
+            <a:r>
+              <a:rPr lang="cs-CZ" sz="2400" dirty="0" smtClean="0">
+                <a:solidFill>
+                  <a:schemeClr val="tx1">
+                    <a:lumMod val="50000"/>
+                    <a:lumOff val="50000"/>
+                  </a:schemeClr>
+                </a:solidFill>
+                <a:latin typeface="Segoe UI" panose="020B0502040204020203" pitchFamily="34" charset="0"/>
+                <a:cs typeface="Segoe UI" panose="020B0502040204020203" pitchFamily="34" charset="0"/>
+              </a:rPr>
+              <a:t>)</a:t>
+            </a:r>
+            <a:endParaRPr lang="cs-CZ" sz="2400" dirty="0" smtClean="0">
+              <a:latin typeface="Segoe UI" panose="020B0502040204020203" pitchFamily="34" charset="0"/>
+              <a:cs typeface="Segoe UI" panose="020B0502040204020203" pitchFamily="34" charset="0"/>
+            </a:endParaRPr>
           </a:p>
           <a:p>
             <a:pPr marL="800100" lvl="1" indent="-342900">
@@ -4867,11 +4884,58 @@
               <a:buChar char="-"/>
             </a:pPr>
             <a:r>
+              <a:rPr lang="cs-CZ" sz="2400" dirty="0" err="1">
+                <a:latin typeface="Segoe UI" panose="020B0502040204020203" pitchFamily="34" charset="0"/>
+                <a:cs typeface="Segoe UI" panose="020B0502040204020203" pitchFamily="34" charset="0"/>
+              </a:rPr>
+              <a:t>MiniProfiler</a:t>
+            </a:r>
+            <a:r>
               <a:rPr lang="cs-CZ" sz="2400" dirty="0">
                 <a:latin typeface="Segoe UI" panose="020B0502040204020203" pitchFamily="34" charset="0"/>
                 <a:cs typeface="Segoe UI" panose="020B0502040204020203" pitchFamily="34" charset="0"/>
               </a:rPr>
-              <a:t>Entity Framework </a:t>
+              <a:t> </a:t>
+            </a:r>
+            <a:r>
+              <a:rPr lang="cs-CZ" sz="2400" dirty="0">
+                <a:solidFill>
+                  <a:schemeClr val="tx1">
+                    <a:lumMod val="50000"/>
+                    <a:lumOff val="50000"/>
+                  </a:schemeClr>
+                </a:solidFill>
+                <a:latin typeface="Segoe UI" panose="020B0502040204020203" pitchFamily="34" charset="0"/>
+                <a:cs typeface="Segoe UI" panose="020B0502040204020203" pitchFamily="34" charset="0"/>
+              </a:rPr>
+              <a:t>(free)</a:t>
+            </a:r>
+            <a:endParaRPr lang="cs-CZ" sz="2400" dirty="0" smtClean="0">
+              <a:latin typeface="Segoe UI" panose="020B0502040204020203" pitchFamily="34" charset="0"/>
+              <a:cs typeface="Segoe UI" panose="020B0502040204020203" pitchFamily="34" charset="0"/>
+            </a:endParaRPr>
+          </a:p>
+          <a:p>
+            <a:pPr marL="800100" lvl="1" indent="-342900">
+              <a:lnSpc>
+                <a:spcPct val="120000"/>
+              </a:lnSpc>
+              <a:buFontTx/>
+              <a:buChar char="-"/>
+            </a:pPr>
+            <a:r>
+              <a:rPr lang="cs-CZ" sz="2400" dirty="0" smtClean="0">
+                <a:latin typeface="Segoe UI" panose="020B0502040204020203" pitchFamily="34" charset="0"/>
+                <a:cs typeface="Segoe UI" panose="020B0502040204020203" pitchFamily="34" charset="0"/>
+              </a:rPr>
+              <a:t>Entity </a:t>
+            </a:r>
+            <a:r>
+              <a:rPr lang="cs-CZ" sz="2400" dirty="0">
+                <a:latin typeface="Segoe UI" panose="020B0502040204020203" pitchFamily="34" charset="0"/>
+                <a:cs typeface="Segoe UI" panose="020B0502040204020203" pitchFamily="34" charset="0"/>
+              </a:rPr>
+              <a:t>Framework </a:t>
             </a:r>
             <a:r>
               <a:rPr lang="cs-CZ" sz="2400" dirty="0" err="1">
@@ -5044,8 +5108,8 @@
         </p:nvSpPr>
         <p:spPr>
           <a:xfrm>
-            <a:off x="1061724" y="5160494"/>
-            <a:ext cx="5525608" cy="1200329"/>
+            <a:off x="1061724" y="5701039"/>
+            <a:ext cx="5525608" cy="923330"/>
           </a:xfrm>
           <a:prstGeom prst="rect">
             <a:avLst/>
@@ -5077,21 +5141,11 @@
           <a:p>
             <a:r>
               <a:rPr lang="cs-CZ" dirty="0" smtClean="0"/>
-              <a:t>Cena pro 1 </a:t>
-            </a:r>
-            <a:r>
-              <a:rPr lang="cs-CZ" dirty="0" err="1" smtClean="0"/>
-              <a:t>dev</a:t>
+              <a:t>Sleva </a:t>
             </a:r>
             <a:r>
               <a:rPr lang="cs-CZ" dirty="0" smtClean="0"/>
-              <a:t> cca 12 tis. </a:t>
-            </a:r>
-          </a:p>
-          <a:p>
-            <a:r>
-              <a:rPr lang="cs-CZ" dirty="0" smtClean="0"/>
-              <a:t>Sleva 15% s kódem  </a:t>
+              <a:t>15% s kódem  </a:t>
             </a:r>
             <a:r>
               <a:rPr lang="cs-CZ" sz="1700" dirty="0" smtClean="0">
@@ -5134,7 +5188,7 @@
         </p:blipFill>
         <p:spPr bwMode="auto">
           <a:xfrm>
-            <a:off x="6300470" y="4738554"/>
+            <a:off x="6300470" y="4997213"/>
             <a:ext cx="2360003" cy="1629252"/>
           </a:xfrm>
           <a:prstGeom prst="rect">

</xml_diff>